<commit_message>
Added minor changes: 1) Tidied up slides 2) Refined Goals of the session
</commit_message>
<xml_diff>
--- a/HandsOnSession.pptx
+++ b/HandsOnSession.pptx
@@ -7,8 +7,8 @@
   <p:sldIdLst>
     <p:sldId id="256" r:id="rId2"/>
     <p:sldId id="257" r:id="rId3"/>
-    <p:sldId id="259" r:id="rId4"/>
-    <p:sldId id="258" r:id="rId5"/>
+    <p:sldId id="258" r:id="rId4"/>
+    <p:sldId id="259" r:id="rId5"/>
     <p:sldId id="260" r:id="rId6"/>
     <p:sldId id="261" r:id="rId7"/>
   </p:sldIdLst>
@@ -111,7 +111,7 @@
   </p:defaultTextStyle>
   <p:extLst>
     <p:ext uri="{521415D9-36F7-43E2-AB2F-B90AF26B5E84}">
-      <p14:sectionLst xmlns:p14="http://schemas.microsoft.com/office/powerpoint/2010/main">
+      <p14:sectionLst xmlns:p14="http://schemas.microsoft.com/office/powerpoint/2010/main" xmlns="">
         <p14:section name="Default Section" id="{D71F938D-302D-4065-80DF-4BED9E09BB44}">
           <p14:sldIdLst>
             <p14:sldId id="256"/>
@@ -125,7 +125,7 @@
       </p14:sectionLst>
     </p:ext>
     <p:ext uri="{EFAFB233-063F-42B5-8137-9DF3F51BA10A}">
-      <p15:sldGuideLst xmlns:p15="http://schemas.microsoft.com/office/powerpoint/2012/main"/>
+      <p15:sldGuideLst xmlns:p15="http://schemas.microsoft.com/office/powerpoint/2012/main" xmlns=""/>
     </p:ext>
   </p:extLst>
 </p:presentation>
@@ -1160,7 +1160,11 @@
         <a:p>
           <a:r>
             <a:rPr lang="en-US" dirty="0" smtClean="0"/>
-            <a:t>Setup Wireless</a:t>
+            <a:t>Setup </a:t>
+          </a:r>
+          <a:r>
+            <a:rPr lang="en-US" dirty="0" smtClean="0"/>
+            <a:t>Wireless Connection</a:t>
           </a:r>
           <a:endParaRPr lang="en-US" dirty="0"/>
         </a:p>
@@ -1234,6 +1238,13 @@
         </dgm:presLayoutVars>
       </dgm:prSet>
       <dgm:spPr/>
+      <dgm:t>
+        <a:bodyPr/>
+        <a:lstStyle/>
+        <a:p>
+          <a:endParaRPr lang="en-US"/>
+        </a:p>
+      </dgm:t>
     </dgm:pt>
     <dgm:pt modelId="{EDB735A4-C501-443F-8B87-3F15E6D1FB83}" type="pres">
       <dgm:prSet presAssocID="{7D50EE0A-5E37-483E-858D-245C75982381}" presName="composite" presStyleCnt="0"/>
@@ -1286,6 +1297,13 @@
         </dgm:presLayoutVars>
       </dgm:prSet>
       <dgm:spPr/>
+      <dgm:t>
+        <a:bodyPr/>
+        <a:lstStyle/>
+        <a:p>
+          <a:endParaRPr lang="en-US"/>
+        </a:p>
+      </dgm:t>
     </dgm:pt>
     <dgm:pt modelId="{A8B4133F-A07A-420E-9F0B-7C62F99DDC6C}" type="pres">
       <dgm:prSet presAssocID="{4E992820-804F-45B4-9FF7-C052709C511F}" presName="descendantText" presStyleLbl="alignAcc1" presStyleIdx="1" presStyleCnt="3">
@@ -1318,6 +1336,13 @@
         </dgm:presLayoutVars>
       </dgm:prSet>
       <dgm:spPr/>
+      <dgm:t>
+        <a:bodyPr/>
+        <a:lstStyle/>
+        <a:p>
+          <a:endParaRPr lang="en-US"/>
+        </a:p>
+      </dgm:t>
     </dgm:pt>
     <dgm:pt modelId="{B9AEF715-1623-4034-AAE1-777C3AA0C75F}" type="pres">
       <dgm:prSet presAssocID="{33D771E8-7AFF-4202-90B9-442B6E2D4330}" presName="descendantText" presStyleLbl="alignAcc1" presStyleIdx="2" presStyleCnt="3">
@@ -1336,24 +1361,24 @@
     </dgm:pt>
   </dgm:ptLst>
   <dgm:cxnLst>
-    <dgm:cxn modelId="{ADC7F152-5182-4BE0-ACA5-017738D74153}" type="presOf" srcId="{7D50EE0A-5E37-483E-858D-245C75982381}" destId="{DDD49E4B-A5CD-42E1-82AF-2F95291E9037}" srcOrd="0" destOrd="0" presId="urn:microsoft.com/office/officeart/2005/8/layout/chevron2"/>
-    <dgm:cxn modelId="{571D79B2-4355-4257-86BA-A2A3A25B62AF}" type="presOf" srcId="{63718738-A8AF-4BAE-8B9B-AEA69E34B669}" destId="{A8B4133F-A07A-420E-9F0B-7C62F99DDC6C}" srcOrd="0" destOrd="0" presId="urn:microsoft.com/office/officeart/2005/8/layout/chevron2"/>
+    <dgm:cxn modelId="{9E114771-A52A-4BED-BC79-BF8B19734A99}" type="presOf" srcId="{5AD907EE-E586-4DEA-8220-5E5CA4DA1573}" destId="{C1B8001C-4C4D-4090-B9CE-B2FE02E8456A}" srcOrd="0" destOrd="0" presId="urn:microsoft.com/office/officeart/2005/8/layout/chevron2"/>
+    <dgm:cxn modelId="{D8C780DA-5482-46DB-8777-3224DCD40E22}" type="presOf" srcId="{C065B26E-0CDF-4324-B70C-5EAF9B3377CA}" destId="{B44D59CF-E07B-481A-9DA5-E5FE435401E5}" srcOrd="0" destOrd="0" presId="urn:microsoft.com/office/officeart/2005/8/layout/chevron2"/>
     <dgm:cxn modelId="{DF3FED74-0E0B-40ED-97BA-F6A30328B56C}" srcId="{C065B26E-0CDF-4324-B70C-5EAF9B3377CA}" destId="{4E992820-804F-45B4-9FF7-C052709C511F}" srcOrd="1" destOrd="0" parTransId="{AB8699AB-B833-42FC-A4F3-99A99A0F85E6}" sibTransId="{96C836EB-93DD-44E3-993C-8BCDA2459C42}"/>
+    <dgm:cxn modelId="{D45A1DCD-751F-495E-A80D-E4E4AEEC07AF}" type="presOf" srcId="{EC4AFC56-9090-4843-8380-650FA8B863E6}" destId="{B9AEF715-1623-4034-AAE1-777C3AA0C75F}" srcOrd="0" destOrd="0" presId="urn:microsoft.com/office/officeart/2005/8/layout/chevron2"/>
+    <dgm:cxn modelId="{9C385462-6C91-44BD-9C35-7923D7994ABE}" srcId="{C065B26E-0CDF-4324-B70C-5EAF9B3377CA}" destId="{33D771E8-7AFF-4202-90B9-442B6E2D4330}" srcOrd="2" destOrd="0" parTransId="{F48E3167-44F9-425B-AEA3-032A11DD6927}" sibTransId="{303F4570-EB9D-443A-832A-B8C7E1B4ABEA}"/>
     <dgm:cxn modelId="{3CE0A2D4-AC55-48EB-AC7C-38927CC14EE4}" srcId="{7D50EE0A-5E37-483E-858D-245C75982381}" destId="{5AD907EE-E586-4DEA-8220-5E5CA4DA1573}" srcOrd="0" destOrd="0" parTransId="{B7202192-49BD-4DBB-AAEA-80194531156A}" sibTransId="{F82790DD-6C00-49D3-9C81-D36C3CF3D68D}"/>
     <dgm:cxn modelId="{05E26828-7F54-41DC-8325-8CB061750BEA}" type="presOf" srcId="{3CA75F11-E813-4738-8B37-462D1AE7D558}" destId="{A8B4133F-A07A-420E-9F0B-7C62F99DDC6C}" srcOrd="0" destOrd="1" presId="urn:microsoft.com/office/officeart/2005/8/layout/chevron2"/>
+    <dgm:cxn modelId="{571D79B2-4355-4257-86BA-A2A3A25B62AF}" type="presOf" srcId="{63718738-A8AF-4BAE-8B9B-AEA69E34B669}" destId="{A8B4133F-A07A-420E-9F0B-7C62F99DDC6C}" srcOrd="0" destOrd="0" presId="urn:microsoft.com/office/officeart/2005/8/layout/chevron2"/>
+    <dgm:cxn modelId="{1162D3B6-22E6-46A2-AC1F-670C79ADB192}" srcId="{4E992820-804F-45B4-9FF7-C052709C511F}" destId="{3CA75F11-E813-4738-8B37-462D1AE7D558}" srcOrd="1" destOrd="0" parTransId="{DC84C3A6-95BC-4FE6-B9FF-3448F2B7263B}" sibTransId="{BA916917-45E2-4974-A4CE-142CF12340BD}"/>
+    <dgm:cxn modelId="{3B876AB7-BE81-4930-A0E0-CFD6E4CE65E9}" type="presOf" srcId="{42F2CC66-35BD-4C95-B3BD-24C5F06B51E4}" destId="{C1B8001C-4C4D-4090-B9CE-B2FE02E8456A}" srcOrd="0" destOrd="1" presId="urn:microsoft.com/office/officeart/2005/8/layout/chevron2"/>
+    <dgm:cxn modelId="{2FF38CE0-06A7-4495-BB4C-ED76F0FC7125}" type="presOf" srcId="{33D771E8-7AFF-4202-90B9-442B6E2D4330}" destId="{05686888-9FE9-449C-9635-74CB6BECAB9B}" srcOrd="0" destOrd="0" presId="urn:microsoft.com/office/officeart/2005/8/layout/chevron2"/>
+    <dgm:cxn modelId="{63222DD1-3D9A-4AC2-9473-5E64E946F3F7}" srcId="{4E992820-804F-45B4-9FF7-C052709C511F}" destId="{63718738-A8AF-4BAE-8B9B-AEA69E34B669}" srcOrd="0" destOrd="0" parTransId="{6A5B3C76-5148-4D65-BE93-9BBD76CD6558}" sibTransId="{E9D59FF7-680F-47A1-8D2E-F80C448BBE38}"/>
+    <dgm:cxn modelId="{B270DB42-0B8C-4AE6-A91D-4942878C702E}" srcId="{C065B26E-0CDF-4324-B70C-5EAF9B3377CA}" destId="{7D50EE0A-5E37-483E-858D-245C75982381}" srcOrd="0" destOrd="0" parTransId="{D4405001-CBBC-4615-B0D7-A1ECD080C838}" sibTransId="{2F591C3E-E080-4F20-B5B8-EE162C709B53}"/>
+    <dgm:cxn modelId="{ADC7F152-5182-4BE0-ACA5-017738D74153}" type="presOf" srcId="{7D50EE0A-5E37-483E-858D-245C75982381}" destId="{DDD49E4B-A5CD-42E1-82AF-2F95291E9037}" srcOrd="0" destOrd="0" presId="urn:microsoft.com/office/officeart/2005/8/layout/chevron2"/>
     <dgm:cxn modelId="{BD67D549-6FA1-4EA1-ADE1-A4A0DD9EDA44}" type="presOf" srcId="{4E992820-804F-45B4-9FF7-C052709C511F}" destId="{B31F23BA-6F53-408C-8CE9-C4D18256F962}" srcOrd="0" destOrd="0" presId="urn:microsoft.com/office/officeart/2005/8/layout/chevron2"/>
+    <dgm:cxn modelId="{DC102EE6-446F-49BE-B582-E44822CF8D0D}" srcId="{33D771E8-7AFF-4202-90B9-442B6E2D4330}" destId="{EC4AFC56-9090-4843-8380-650FA8B863E6}" srcOrd="0" destOrd="0" parTransId="{E91E6B45-3E33-4807-B275-F1BC970A6AB2}" sibTransId="{E34B871C-2DE5-48C2-AC26-72170109AD69}"/>
     <dgm:cxn modelId="{815023EE-1457-4913-B326-E96B67AAFC90}" srcId="{7D50EE0A-5E37-483E-858D-245C75982381}" destId="{42F2CC66-35BD-4C95-B3BD-24C5F06B51E4}" srcOrd="1" destOrd="0" parTransId="{D5203C64-2F18-4F25-90B5-36A873A52F18}" sibTransId="{4CB92ED9-5469-41A0-B1B4-A1B02C1E2895}"/>
-    <dgm:cxn modelId="{D45A1DCD-751F-495E-A80D-E4E4AEEC07AF}" type="presOf" srcId="{EC4AFC56-9090-4843-8380-650FA8B863E6}" destId="{B9AEF715-1623-4034-AAE1-777C3AA0C75F}" srcOrd="0" destOrd="0" presId="urn:microsoft.com/office/officeart/2005/8/layout/chevron2"/>
-    <dgm:cxn modelId="{1162D3B6-22E6-46A2-AC1F-670C79ADB192}" srcId="{4E992820-804F-45B4-9FF7-C052709C511F}" destId="{3CA75F11-E813-4738-8B37-462D1AE7D558}" srcOrd="1" destOrd="0" parTransId="{DC84C3A6-95BC-4FE6-B9FF-3448F2B7263B}" sibTransId="{BA916917-45E2-4974-A4CE-142CF12340BD}"/>
     <dgm:cxn modelId="{EE888E1B-617F-43C8-AB29-CD600BB31168}" type="presOf" srcId="{0B7D418A-D7AF-409E-BFB9-BC58A5354A6D}" destId="{B9AEF715-1623-4034-AAE1-777C3AA0C75F}" srcOrd="0" destOrd="1" presId="urn:microsoft.com/office/officeart/2005/8/layout/chevron2"/>
-    <dgm:cxn modelId="{D8C780DA-5482-46DB-8777-3224DCD40E22}" type="presOf" srcId="{C065B26E-0CDF-4324-B70C-5EAF9B3377CA}" destId="{B44D59CF-E07B-481A-9DA5-E5FE435401E5}" srcOrd="0" destOrd="0" presId="urn:microsoft.com/office/officeart/2005/8/layout/chevron2"/>
-    <dgm:cxn modelId="{63222DD1-3D9A-4AC2-9473-5E64E946F3F7}" srcId="{4E992820-804F-45B4-9FF7-C052709C511F}" destId="{63718738-A8AF-4BAE-8B9B-AEA69E34B669}" srcOrd="0" destOrd="0" parTransId="{6A5B3C76-5148-4D65-BE93-9BBD76CD6558}" sibTransId="{E9D59FF7-680F-47A1-8D2E-F80C448BBE38}"/>
-    <dgm:cxn modelId="{9E114771-A52A-4BED-BC79-BF8B19734A99}" type="presOf" srcId="{5AD907EE-E586-4DEA-8220-5E5CA4DA1573}" destId="{C1B8001C-4C4D-4090-B9CE-B2FE02E8456A}" srcOrd="0" destOrd="0" presId="urn:microsoft.com/office/officeart/2005/8/layout/chevron2"/>
-    <dgm:cxn modelId="{9C385462-6C91-44BD-9C35-7923D7994ABE}" srcId="{C065B26E-0CDF-4324-B70C-5EAF9B3377CA}" destId="{33D771E8-7AFF-4202-90B9-442B6E2D4330}" srcOrd="2" destOrd="0" parTransId="{F48E3167-44F9-425B-AEA3-032A11DD6927}" sibTransId="{303F4570-EB9D-443A-832A-B8C7E1B4ABEA}"/>
-    <dgm:cxn modelId="{2FF38CE0-06A7-4495-BB4C-ED76F0FC7125}" type="presOf" srcId="{33D771E8-7AFF-4202-90B9-442B6E2D4330}" destId="{05686888-9FE9-449C-9635-74CB6BECAB9B}" srcOrd="0" destOrd="0" presId="urn:microsoft.com/office/officeart/2005/8/layout/chevron2"/>
-    <dgm:cxn modelId="{B270DB42-0B8C-4AE6-A91D-4942878C702E}" srcId="{C065B26E-0CDF-4324-B70C-5EAF9B3377CA}" destId="{7D50EE0A-5E37-483E-858D-245C75982381}" srcOrd="0" destOrd="0" parTransId="{D4405001-CBBC-4615-B0D7-A1ECD080C838}" sibTransId="{2F591C3E-E080-4F20-B5B8-EE162C709B53}"/>
-    <dgm:cxn modelId="{DC102EE6-446F-49BE-B582-E44822CF8D0D}" srcId="{33D771E8-7AFF-4202-90B9-442B6E2D4330}" destId="{EC4AFC56-9090-4843-8380-650FA8B863E6}" srcOrd="0" destOrd="0" parTransId="{E91E6B45-3E33-4807-B275-F1BC970A6AB2}" sibTransId="{E34B871C-2DE5-48C2-AC26-72170109AD69}"/>
-    <dgm:cxn modelId="{3B876AB7-BE81-4930-A0E0-CFD6E4CE65E9}" type="presOf" srcId="{42F2CC66-35BD-4C95-B3BD-24C5F06B51E4}" destId="{C1B8001C-4C4D-4090-B9CE-B2FE02E8456A}" srcOrd="0" destOrd="1" presId="urn:microsoft.com/office/officeart/2005/8/layout/chevron2"/>
     <dgm:cxn modelId="{AFC61354-834A-4505-9514-BE3D96F640B6}" srcId="{33D771E8-7AFF-4202-90B9-442B6E2D4330}" destId="{0B7D418A-D7AF-409E-BFB9-BC58A5354A6D}" srcOrd="1" destOrd="0" parTransId="{65DE66CC-CDDD-4D04-B6B5-C2DE06A76E70}" sibTransId="{EE2F63BE-FD46-4947-81C8-0F794132BD50}"/>
     <dgm:cxn modelId="{47240E7B-A38D-41BC-96AA-FEC9588EB987}" type="presParOf" srcId="{B44D59CF-E07B-481A-9DA5-E5FE435401E5}" destId="{EDB735A4-C501-443F-8B87-3F15E6D1FB83}" srcOrd="0" destOrd="0" presId="urn:microsoft.com/office/officeart/2005/8/layout/chevron2"/>
     <dgm:cxn modelId="{5B89B34C-0CA4-42CD-A4FD-DC2709EB3122}" type="presParOf" srcId="{EDB735A4-C501-443F-8B87-3F15E6D1FB83}" destId="{DDD49E4B-A5CD-42E1-82AF-2F95291E9037}" srcOrd="0" destOrd="0" presId="urn:microsoft.com/office/officeart/2005/8/layout/chevron2"/>
@@ -1371,14 +1396,14 @@
   <dgm:whole/>
   <dgm:extLst>
     <a:ext uri="http://schemas.microsoft.com/office/drawing/2008/diagram">
-      <dsp:dataModelExt xmlns:dsp="http://schemas.microsoft.com/office/drawing/2008/diagram" relId="rId6" minVer="http://schemas.openxmlformats.org/drawingml/2006/diagram"/>
+      <dsp:dataModelExt xmlns:dsp="http://schemas.microsoft.com/office/drawing/2008/diagram" xmlns="" relId="rId6" minVer="http://schemas.openxmlformats.org/drawingml/2006/diagram"/>
     </a:ext>
   </dgm:extLst>
 </dgm:dataModel>
 </file>
 
 <file path=ppt/diagrams/drawing1.xml><?xml version="1.0" encoding="utf-8"?>
-<dsp:drawing xmlns:dgm="http://schemas.openxmlformats.org/drawingml/2006/diagram" xmlns:dsp="http://schemas.microsoft.com/office/drawing/2008/diagram" xmlns:a="http://schemas.openxmlformats.org/drawingml/2006/main">
+<dsp:drawing xmlns:dgm="http://schemas.openxmlformats.org/drawingml/2006/diagram" xmlns:a="http://schemas.openxmlformats.org/drawingml/2006/main" xmlns:dsp="http://schemas.microsoft.com/office/drawing/2008/diagram">
   <dsp:spTree>
     <dsp:nvGrpSpPr>
       <dsp:cNvPr id="0" name=""/>
@@ -1458,9 +1483,9 @@
           <a:endParaRPr lang="en-US" sz="1600" kern="1200" dirty="0"/>
         </a:p>
       </dsp:txBody>
-      <dsp:txXfrm rot="-5400000">
-        <a:off x="1" y="679096"/>
-        <a:ext cx="1352020" cy="579438"/>
+      <dsp:txXfrm rot="5400000">
+        <a:off x="-289718" y="292805"/>
+        <a:ext cx="1931458" cy="1352020"/>
       </dsp:txXfrm>
     </dsp:sp>
     <dsp:sp modelId="{C1B8001C-4C4D-4090-B9CE-B2FE02E8456A}">
@@ -1555,9 +1580,9 @@
           <a:endParaRPr lang="en-US" sz="3500" kern="1200" dirty="0"/>
         </a:p>
       </dsp:txBody>
-      <dsp:txXfrm rot="-5400000">
-        <a:off x="1352020" y="64373"/>
-        <a:ext cx="6714693" cy="1132875"/>
+      <dsp:txXfrm rot="5400000">
+        <a:off x="4112286" y="-2757179"/>
+        <a:ext cx="1255447" cy="6775979"/>
       </dsp:txXfrm>
     </dsp:sp>
     <dsp:sp modelId="{B31F23BA-6F53-408C-8CE9-C4D18256F962}">
@@ -1633,9 +1658,9 @@
           <a:endParaRPr lang="en-US" sz="1600" kern="1200" dirty="0"/>
         </a:p>
       </dsp:txBody>
-      <dsp:txXfrm rot="-5400000">
-        <a:off x="1" y="2419614"/>
-        <a:ext cx="1352020" cy="579438"/>
+      <dsp:txXfrm rot="5400000">
+        <a:off x="-289718" y="2033323"/>
+        <a:ext cx="1931458" cy="1352020"/>
       </dsp:txXfrm>
     </dsp:sp>
     <dsp:sp modelId="{A8B4133F-A07A-420E-9F0B-7C62F99DDC6C}">
@@ -1730,9 +1755,9 @@
           <a:endParaRPr lang="en-US" sz="3500" kern="1200" dirty="0"/>
         </a:p>
       </dsp:txBody>
-      <dsp:txXfrm rot="-5400000">
-        <a:off x="1352020" y="1804891"/>
-        <a:ext cx="6714693" cy="1132875"/>
+      <dsp:txXfrm rot="5400000">
+        <a:off x="4112286" y="-1016661"/>
+        <a:ext cx="1255447" cy="6775979"/>
       </dsp:txXfrm>
     </dsp:sp>
     <dsp:sp modelId="{05686888-9FE9-449C-9635-74CB6BECAB9B}">
@@ -1808,9 +1833,9 @@
           <a:endParaRPr lang="en-US" sz="1600" kern="1200" dirty="0"/>
         </a:p>
       </dsp:txBody>
-      <dsp:txXfrm rot="-5400000">
-        <a:off x="1" y="4160131"/>
-        <a:ext cx="1352020" cy="579438"/>
+      <dsp:txXfrm rot="5400000">
+        <a:off x="-289718" y="3773840"/>
+        <a:ext cx="1931458" cy="1352020"/>
       </dsp:txXfrm>
     </dsp:sp>
     <dsp:sp modelId="{B9AEF715-1623-4034-AAE1-777C3AA0C75F}">
@@ -1881,7 +1906,11 @@
           </a:pPr>
           <a:r>
             <a:rPr lang="en-US" sz="3500" kern="1200" dirty="0" smtClean="0"/>
-            <a:t>Setup Wireless</a:t>
+            <a:t>Setup </a:t>
+          </a:r>
+          <a:r>
+            <a:rPr lang="en-US" sz="3500" kern="1200" dirty="0" smtClean="0"/>
+            <a:t>Wireless Connection</a:t>
           </a:r>
           <a:endParaRPr lang="en-US" sz="3500" kern="1200" dirty="0"/>
         </a:p>
@@ -1905,9 +1934,9 @@
           <a:endParaRPr lang="en-US" sz="3500" kern="1200" dirty="0"/>
         </a:p>
       </dsp:txBody>
-      <dsp:txXfrm rot="-5400000">
-        <a:off x="1352020" y="3545408"/>
-        <a:ext cx="6714693" cy="1132875"/>
+      <dsp:txXfrm rot="5400000">
+        <a:off x="4112286" y="723856"/>
+        <a:ext cx="1255447" cy="6775979"/>
       </dsp:txXfrm>
     </dsp:sp>
   </dsp:spTree>
@@ -3335,7 +3364,8 @@
           <a:p>
             <a:fld id="{324330AA-EB2F-45B6-85AE-40E07F275590}" type="datetimeFigureOut">
               <a:rPr lang="en-US" smtClean="0"/>
-              <a:t>6/14/15</a:t>
+              <a:pPr/>
+              <a:t>6/15/2015</a:t>
             </a:fld>
             <a:endParaRPr lang="en-US"/>
           </a:p>
@@ -3377,6 +3407,7 @@
           <a:p>
             <a:fld id="{6DE80E5E-9D2B-4E80-87C5-E34963A60029}" type="slidenum">
               <a:rPr lang="en-US" smtClean="0"/>
+              <a:pPr/>
               <a:t>‹#›</a:t>
             </a:fld>
             <a:endParaRPr lang="en-US"/>
@@ -3386,7 +3417,7 @@
     </p:spTree>
     <p:extLst>
       <p:ext uri="{BB962C8B-B14F-4D97-AF65-F5344CB8AC3E}">
-        <p14:creationId xmlns:p14="http://schemas.microsoft.com/office/powerpoint/2010/main" val="3753450159"/>
+        <p14:creationId xmlns:p14="http://schemas.microsoft.com/office/powerpoint/2010/main" xmlns="" val="3753450159"/>
       </p:ext>
     </p:extLst>
   </p:cSld>
@@ -3505,7 +3536,8 @@
           <a:p>
             <a:fld id="{324330AA-EB2F-45B6-85AE-40E07F275590}" type="datetimeFigureOut">
               <a:rPr lang="en-US" smtClean="0"/>
-              <a:t>6/14/15</a:t>
+              <a:pPr/>
+              <a:t>6/15/2015</a:t>
             </a:fld>
             <a:endParaRPr lang="en-US"/>
           </a:p>
@@ -3547,6 +3579,7 @@
           <a:p>
             <a:fld id="{6DE80E5E-9D2B-4E80-87C5-E34963A60029}" type="slidenum">
               <a:rPr lang="en-US" smtClean="0"/>
+              <a:pPr/>
               <a:t>‹#›</a:t>
             </a:fld>
             <a:endParaRPr lang="en-US"/>
@@ -3556,7 +3589,7 @@
     </p:spTree>
     <p:extLst>
       <p:ext uri="{BB962C8B-B14F-4D97-AF65-F5344CB8AC3E}">
-        <p14:creationId xmlns:p14="http://schemas.microsoft.com/office/powerpoint/2010/main" val="2614356958"/>
+        <p14:creationId xmlns:p14="http://schemas.microsoft.com/office/powerpoint/2010/main" xmlns="" val="2614356958"/>
       </p:ext>
     </p:extLst>
   </p:cSld>
@@ -3685,7 +3718,8 @@
           <a:p>
             <a:fld id="{324330AA-EB2F-45B6-85AE-40E07F275590}" type="datetimeFigureOut">
               <a:rPr lang="en-US" smtClean="0"/>
-              <a:t>6/14/15</a:t>
+              <a:pPr/>
+              <a:t>6/15/2015</a:t>
             </a:fld>
             <a:endParaRPr lang="en-US"/>
           </a:p>
@@ -3727,6 +3761,7 @@
           <a:p>
             <a:fld id="{6DE80E5E-9D2B-4E80-87C5-E34963A60029}" type="slidenum">
               <a:rPr lang="en-US" smtClean="0"/>
+              <a:pPr/>
               <a:t>‹#›</a:t>
             </a:fld>
             <a:endParaRPr lang="en-US"/>
@@ -3736,7 +3771,7 @@
     </p:spTree>
     <p:extLst>
       <p:ext uri="{BB962C8B-B14F-4D97-AF65-F5344CB8AC3E}">
-        <p14:creationId xmlns:p14="http://schemas.microsoft.com/office/powerpoint/2010/main" val="1274747117"/>
+        <p14:creationId xmlns:p14="http://schemas.microsoft.com/office/powerpoint/2010/main" xmlns="" val="1274747117"/>
       </p:ext>
     </p:extLst>
   </p:cSld>
@@ -3855,7 +3890,8 @@
           <a:p>
             <a:fld id="{324330AA-EB2F-45B6-85AE-40E07F275590}" type="datetimeFigureOut">
               <a:rPr lang="en-US" smtClean="0"/>
-              <a:t>6/14/15</a:t>
+              <a:pPr/>
+              <a:t>6/15/2015</a:t>
             </a:fld>
             <a:endParaRPr lang="en-US"/>
           </a:p>
@@ -3897,6 +3933,7 @@
           <a:p>
             <a:fld id="{6DE80E5E-9D2B-4E80-87C5-E34963A60029}" type="slidenum">
               <a:rPr lang="en-US" smtClean="0"/>
+              <a:pPr/>
               <a:t>‹#›</a:t>
             </a:fld>
             <a:endParaRPr lang="en-US"/>
@@ -3906,7 +3943,7 @@
     </p:spTree>
     <p:extLst>
       <p:ext uri="{BB962C8B-B14F-4D97-AF65-F5344CB8AC3E}">
-        <p14:creationId xmlns:p14="http://schemas.microsoft.com/office/powerpoint/2010/main" val="194611429"/>
+        <p14:creationId xmlns:p14="http://schemas.microsoft.com/office/powerpoint/2010/main" xmlns="" val="194611429"/>
       </p:ext>
     </p:extLst>
   </p:cSld>
@@ -4101,7 +4138,8 @@
           <a:p>
             <a:fld id="{324330AA-EB2F-45B6-85AE-40E07F275590}" type="datetimeFigureOut">
               <a:rPr lang="en-US" smtClean="0"/>
-              <a:t>6/14/15</a:t>
+              <a:pPr/>
+              <a:t>6/15/2015</a:t>
             </a:fld>
             <a:endParaRPr lang="en-US"/>
           </a:p>
@@ -4143,6 +4181,7 @@
           <a:p>
             <a:fld id="{6DE80E5E-9D2B-4E80-87C5-E34963A60029}" type="slidenum">
               <a:rPr lang="en-US" smtClean="0"/>
+              <a:pPr/>
               <a:t>‹#›</a:t>
             </a:fld>
             <a:endParaRPr lang="en-US"/>
@@ -4152,7 +4191,7 @@
     </p:spTree>
     <p:extLst>
       <p:ext uri="{BB962C8B-B14F-4D97-AF65-F5344CB8AC3E}">
-        <p14:creationId xmlns:p14="http://schemas.microsoft.com/office/powerpoint/2010/main" val="2563584822"/>
+        <p14:creationId xmlns:p14="http://schemas.microsoft.com/office/powerpoint/2010/main" xmlns="" val="2563584822"/>
       </p:ext>
     </p:extLst>
   </p:cSld>
@@ -4333,7 +4372,8 @@
           <a:p>
             <a:fld id="{324330AA-EB2F-45B6-85AE-40E07F275590}" type="datetimeFigureOut">
               <a:rPr lang="en-US" smtClean="0"/>
-              <a:t>6/14/15</a:t>
+              <a:pPr/>
+              <a:t>6/15/2015</a:t>
             </a:fld>
             <a:endParaRPr lang="en-US"/>
           </a:p>
@@ -4375,6 +4415,7 @@
           <a:p>
             <a:fld id="{6DE80E5E-9D2B-4E80-87C5-E34963A60029}" type="slidenum">
               <a:rPr lang="en-US" smtClean="0"/>
+              <a:pPr/>
               <a:t>‹#›</a:t>
             </a:fld>
             <a:endParaRPr lang="en-US"/>
@@ -4384,7 +4425,7 @@
     </p:spTree>
     <p:extLst>
       <p:ext uri="{BB962C8B-B14F-4D97-AF65-F5344CB8AC3E}">
-        <p14:creationId xmlns:p14="http://schemas.microsoft.com/office/powerpoint/2010/main" val="771170520"/>
+        <p14:creationId xmlns:p14="http://schemas.microsoft.com/office/powerpoint/2010/main" xmlns="" val="771170520"/>
       </p:ext>
     </p:extLst>
   </p:cSld>
@@ -4700,7 +4741,8 @@
           <a:p>
             <a:fld id="{324330AA-EB2F-45B6-85AE-40E07F275590}" type="datetimeFigureOut">
               <a:rPr lang="en-US" smtClean="0"/>
-              <a:t>6/14/15</a:t>
+              <a:pPr/>
+              <a:t>6/15/2015</a:t>
             </a:fld>
             <a:endParaRPr lang="en-US"/>
           </a:p>
@@ -4742,6 +4784,7 @@
           <a:p>
             <a:fld id="{6DE80E5E-9D2B-4E80-87C5-E34963A60029}" type="slidenum">
               <a:rPr lang="en-US" smtClean="0"/>
+              <a:pPr/>
               <a:t>‹#›</a:t>
             </a:fld>
             <a:endParaRPr lang="en-US"/>
@@ -4751,7 +4794,7 @@
     </p:spTree>
     <p:extLst>
       <p:ext uri="{BB962C8B-B14F-4D97-AF65-F5344CB8AC3E}">
-        <p14:creationId xmlns:p14="http://schemas.microsoft.com/office/powerpoint/2010/main" val="2032115200"/>
+        <p14:creationId xmlns:p14="http://schemas.microsoft.com/office/powerpoint/2010/main" xmlns="" val="2032115200"/>
       </p:ext>
     </p:extLst>
   </p:cSld>
@@ -4818,7 +4861,8 @@
           <a:p>
             <a:fld id="{324330AA-EB2F-45B6-85AE-40E07F275590}" type="datetimeFigureOut">
               <a:rPr lang="en-US" smtClean="0"/>
-              <a:t>6/14/15</a:t>
+              <a:pPr/>
+              <a:t>6/15/2015</a:t>
             </a:fld>
             <a:endParaRPr lang="en-US"/>
           </a:p>
@@ -4860,6 +4904,7 @@
           <a:p>
             <a:fld id="{6DE80E5E-9D2B-4E80-87C5-E34963A60029}" type="slidenum">
               <a:rPr lang="en-US" smtClean="0"/>
+              <a:pPr/>
               <a:t>‹#›</a:t>
             </a:fld>
             <a:endParaRPr lang="en-US"/>
@@ -4869,7 +4914,7 @@
     </p:spTree>
     <p:extLst>
       <p:ext uri="{BB962C8B-B14F-4D97-AF65-F5344CB8AC3E}">
-        <p14:creationId xmlns:p14="http://schemas.microsoft.com/office/powerpoint/2010/main" val="1287050640"/>
+        <p14:creationId xmlns:p14="http://schemas.microsoft.com/office/powerpoint/2010/main" xmlns="" val="1287050640"/>
       </p:ext>
     </p:extLst>
   </p:cSld>
@@ -4913,7 +4958,8 @@
           <a:p>
             <a:fld id="{324330AA-EB2F-45B6-85AE-40E07F275590}" type="datetimeFigureOut">
               <a:rPr lang="en-US" smtClean="0"/>
-              <a:t>6/14/15</a:t>
+              <a:pPr/>
+              <a:t>6/15/2015</a:t>
             </a:fld>
             <a:endParaRPr lang="en-US"/>
           </a:p>
@@ -4955,6 +5001,7 @@
           <a:p>
             <a:fld id="{6DE80E5E-9D2B-4E80-87C5-E34963A60029}" type="slidenum">
               <a:rPr lang="en-US" smtClean="0"/>
+              <a:pPr/>
               <a:t>‹#›</a:t>
             </a:fld>
             <a:endParaRPr lang="en-US"/>
@@ -4964,7 +5011,7 @@
     </p:spTree>
     <p:extLst>
       <p:ext uri="{BB962C8B-B14F-4D97-AF65-F5344CB8AC3E}">
-        <p14:creationId xmlns:p14="http://schemas.microsoft.com/office/powerpoint/2010/main" val="969672826"/>
+        <p14:creationId xmlns:p14="http://schemas.microsoft.com/office/powerpoint/2010/main" xmlns="" val="969672826"/>
       </p:ext>
     </p:extLst>
   </p:cSld>
@@ -5190,7 +5237,8 @@
           <a:p>
             <a:fld id="{324330AA-EB2F-45B6-85AE-40E07F275590}" type="datetimeFigureOut">
               <a:rPr lang="en-US" smtClean="0"/>
-              <a:t>6/14/15</a:t>
+              <a:pPr/>
+              <a:t>6/15/2015</a:t>
             </a:fld>
             <a:endParaRPr lang="en-US"/>
           </a:p>
@@ -5232,6 +5280,7 @@
           <a:p>
             <a:fld id="{6DE80E5E-9D2B-4E80-87C5-E34963A60029}" type="slidenum">
               <a:rPr lang="en-US" smtClean="0"/>
+              <a:pPr/>
               <a:t>‹#›</a:t>
             </a:fld>
             <a:endParaRPr lang="en-US"/>
@@ -5241,7 +5290,7 @@
     </p:spTree>
     <p:extLst>
       <p:ext uri="{BB962C8B-B14F-4D97-AF65-F5344CB8AC3E}">
-        <p14:creationId xmlns:p14="http://schemas.microsoft.com/office/powerpoint/2010/main" val="1745065860"/>
+        <p14:creationId xmlns:p14="http://schemas.microsoft.com/office/powerpoint/2010/main" xmlns="" val="1745065860"/>
       </p:ext>
     </p:extLst>
   </p:cSld>
@@ -5443,7 +5492,8 @@
           <a:p>
             <a:fld id="{324330AA-EB2F-45B6-85AE-40E07F275590}" type="datetimeFigureOut">
               <a:rPr lang="en-US" smtClean="0"/>
-              <a:t>6/14/15</a:t>
+              <a:pPr/>
+              <a:t>6/15/2015</a:t>
             </a:fld>
             <a:endParaRPr lang="en-US"/>
           </a:p>
@@ -5485,6 +5535,7 @@
           <a:p>
             <a:fld id="{6DE80E5E-9D2B-4E80-87C5-E34963A60029}" type="slidenum">
               <a:rPr lang="en-US" smtClean="0"/>
+              <a:pPr/>
               <a:t>‹#›</a:t>
             </a:fld>
             <a:endParaRPr lang="en-US"/>
@@ -5494,7 +5545,7 @@
     </p:spTree>
     <p:extLst>
       <p:ext uri="{BB962C8B-B14F-4D97-AF65-F5344CB8AC3E}">
-        <p14:creationId xmlns:p14="http://schemas.microsoft.com/office/powerpoint/2010/main" val="3117742289"/>
+        <p14:creationId xmlns:p14="http://schemas.microsoft.com/office/powerpoint/2010/main" xmlns="" val="3117742289"/>
       </p:ext>
     </p:extLst>
   </p:cSld>
@@ -5656,7 +5707,8 @@
           <a:p>
             <a:fld id="{324330AA-EB2F-45B6-85AE-40E07F275590}" type="datetimeFigureOut">
               <a:rPr lang="en-US" smtClean="0"/>
-              <a:t>6/14/15</a:t>
+              <a:pPr/>
+              <a:t>6/15/2015</a:t>
             </a:fld>
             <a:endParaRPr lang="en-US"/>
           </a:p>
@@ -5734,6 +5786,7 @@
           <a:p>
             <a:fld id="{6DE80E5E-9D2B-4E80-87C5-E34963A60029}" type="slidenum">
               <a:rPr lang="en-US" smtClean="0"/>
+              <a:pPr/>
               <a:t>‹#›</a:t>
             </a:fld>
             <a:endParaRPr lang="en-US"/>
@@ -5743,7 +5796,7 @@
     </p:spTree>
     <p:extLst>
       <p:ext uri="{BB962C8B-B14F-4D97-AF65-F5344CB8AC3E}">
-        <p14:creationId xmlns:p14="http://schemas.microsoft.com/office/powerpoint/2010/main" val="2229854275"/>
+        <p14:creationId xmlns:p14="http://schemas.microsoft.com/office/powerpoint/2010/main" xmlns="" val="2229854275"/>
       </p:ext>
     </p:extLst>
   </p:cSld>
@@ -6074,17 +6127,24 @@
         <p:spPr/>
         <p:txBody>
           <a:bodyPr>
-            <a:normAutofit/>
+            <a:normAutofit fontScale="90000"/>
           </a:bodyPr>
           <a:lstStyle/>
           <a:p>
             <a:r>
               <a:rPr lang="en-US" dirty="0" smtClean="0"/>
-              <a:t>Building Ultra-Embedded Applications </a:t>
+              <a:t>Building Ultra-Embedded Applications using </a:t>
             </a:r>
             <a:r>
               <a:rPr lang="en-US" dirty="0" smtClean="0"/>
-              <a:t>using SOM</a:t>
+              <a:t/>
+            </a:r>
+            <a:br>
+              <a:rPr lang="en-US" dirty="0" smtClean="0"/>
+            </a:br>
+            <a:r>
+              <a:rPr lang="en-US" dirty="0" smtClean="0"/>
+              <a:t>System on Module (SOM)</a:t>
             </a:r>
             <a:endParaRPr lang="en-US" dirty="0"/>
           </a:p>
@@ -6112,7 +6172,7 @@
     </p:spTree>
     <p:extLst>
       <p:ext uri="{BB962C8B-B14F-4D97-AF65-F5344CB8AC3E}">
-        <p14:creationId xmlns:p14="http://schemas.microsoft.com/office/powerpoint/2010/main" val="858209582"/>
+        <p14:creationId xmlns:p14="http://schemas.microsoft.com/office/powerpoint/2010/main" xmlns="" val="858209582"/>
       </p:ext>
     </p:extLst>
   </p:cSld>
@@ -6200,7 +6260,6 @@
               <a:rPr lang="en-US" dirty="0" smtClean="0"/>
               <a:t>Motivation</a:t>
             </a:r>
-            <a:endParaRPr lang="en-US" dirty="0" smtClean="0"/>
           </a:p>
           <a:p>
             <a:r>
@@ -6220,7 +6279,7 @@
     </p:spTree>
     <p:extLst>
       <p:ext uri="{BB962C8B-B14F-4D97-AF65-F5344CB8AC3E}">
-        <p14:creationId xmlns:p14="http://schemas.microsoft.com/office/powerpoint/2010/main" val="620325410"/>
+        <p14:creationId xmlns:p14="http://schemas.microsoft.com/office/powerpoint/2010/main" xmlns="" val="620325410"/>
       </p:ext>
     </p:extLst>
   </p:cSld>
@@ -6271,110 +6330,11 @@
           <a:p>
             <a:r>
               <a:rPr lang="en-US" dirty="0" smtClean="0"/>
-              <a:t>Goal of this session</a:t>
-            </a:r>
-            <a:endParaRPr lang="en-US" dirty="0"/>
-          </a:p>
-        </p:txBody>
-      </p:sp>
-      <p:sp>
-        <p:nvSpPr>
-          <p:cNvPr id="3" name="Content Placeholder 2"/>
-          <p:cNvSpPr>
-            <a:spLocks noGrp="1"/>
-          </p:cNvSpPr>
-          <p:nvPr>
-            <p:ph idx="1"/>
-          </p:nvPr>
-        </p:nvSpPr>
-        <p:spPr/>
-        <p:txBody>
-          <a:bodyPr/>
-          <a:lstStyle/>
-          <a:p>
+              <a:t>What </a:t>
+            </a:r>
             <a:r>
               <a:rPr lang="en-US" dirty="0" smtClean="0"/>
-              <a:t>Help transition from </a:t>
-            </a:r>
-            <a:r>
-              <a:rPr lang="en-US" dirty="0" err="1" smtClean="0"/>
-              <a:t>cRIO</a:t>
-            </a:r>
-            <a:r>
-              <a:rPr lang="en-US" dirty="0" smtClean="0"/>
-              <a:t> to SOM </a:t>
-            </a:r>
-          </a:p>
-          <a:p>
-            <a:r>
-              <a:rPr lang="en-US" dirty="0" smtClean="0"/>
-              <a:t>How to build and test simple embedded system</a:t>
-            </a:r>
-          </a:p>
-          <a:p>
-            <a:r>
-              <a:rPr lang="en-US" dirty="0" smtClean="0"/>
-              <a:t>Ultimately Ultra-embedded system using COTS Hardware and reference designs</a:t>
-            </a:r>
-            <a:endParaRPr lang="en-US" dirty="0"/>
-          </a:p>
-        </p:txBody>
-      </p:sp>
-    </p:spTree>
-    <p:extLst>
-      <p:ext uri="{BB962C8B-B14F-4D97-AF65-F5344CB8AC3E}">
-        <p14:creationId xmlns:p14="http://schemas.microsoft.com/office/powerpoint/2010/main" val="497972247"/>
-      </p:ext>
-    </p:extLst>
-  </p:cSld>
-  <p:clrMapOvr>
-    <a:masterClrMapping/>
-  </p:clrMapOvr>
-  <p:timing>
-    <p:tnLst>
-      <p:par>
-        <p:cTn id="1" dur="indefinite" restart="never" nodeType="tmRoot"/>
-      </p:par>
-    </p:tnLst>
-  </p:timing>
-</p:sld>
-</file>
-
-<file path=ppt/slides/slide4.xml><?xml version="1.0" encoding="utf-8"?>
-<p:sld xmlns:a="http://schemas.openxmlformats.org/drawingml/2006/main" xmlns:r="http://schemas.openxmlformats.org/officeDocument/2006/relationships" xmlns:p="http://schemas.openxmlformats.org/presentationml/2006/main">
-  <p:cSld>
-    <p:spTree>
-      <p:nvGrpSpPr>
-        <p:cNvPr id="1" name=""/>
-        <p:cNvGrpSpPr/>
-        <p:nvPr/>
-      </p:nvGrpSpPr>
-      <p:grpSpPr>
-        <a:xfrm>
-          <a:off x="0" y="0"/>
-          <a:ext cx="0" cy="0"/>
-          <a:chOff x="0" y="0"/>
-          <a:chExt cx="0" cy="0"/>
-        </a:xfrm>
-      </p:grpSpPr>
-      <p:sp>
-        <p:nvSpPr>
-          <p:cNvPr id="2" name="Title 1"/>
-          <p:cNvSpPr>
-            <a:spLocks noGrp="1"/>
-          </p:cNvSpPr>
-          <p:nvPr>
-            <p:ph type="title"/>
-          </p:nvPr>
-        </p:nvSpPr>
-        <p:spPr/>
-        <p:txBody>
-          <a:bodyPr/>
-          <a:lstStyle/>
-          <a:p>
-            <a:r>
-              <a:rPr lang="en-US" dirty="0" smtClean="0"/>
-              <a:t>What will be you build?</a:t>
+              <a:t>you will build</a:t>
             </a:r>
             <a:endParaRPr lang="en-US" dirty="0"/>
           </a:p>
@@ -6389,10 +6349,10 @@
           <p:nvPr/>
         </p:nvPicPr>
         <p:blipFill rotWithShape="1">
-          <a:blip r:embed="rId2">
+          <a:blip r:embed="rId2" cstate="print">
             <a:extLst>
               <a:ext uri="{28A0092B-C50C-407E-A947-70E740481C1C}">
-                <a14:useLocalDpi xmlns:a14="http://schemas.microsoft.com/office/drawing/2010/main" val="0"/>
+                <a14:useLocalDpi xmlns:a14="http://schemas.microsoft.com/office/drawing/2010/main" xmlns="" val="0"/>
               </a:ext>
             </a:extLst>
           </a:blip>
@@ -6410,7 +6370,7 @@
           <a:noFill/>
           <a:extLst>
             <a:ext uri="{909E8E84-426E-40DD-AFC4-6F175D3DCCD1}">
-              <a14:hiddenFill xmlns:a14="http://schemas.microsoft.com/office/drawing/2010/main">
+              <a14:hiddenFill xmlns:a14="http://schemas.microsoft.com/office/drawing/2010/main" xmlns="">
                 <a:solidFill>
                   <a:srgbClr val="FFFFFF"/>
                 </a:solidFill>
@@ -6431,7 +6391,7 @@
           <a:blip r:embed="rId3" cstate="print">
             <a:extLst>
               <a:ext uri="{28A0092B-C50C-407E-A947-70E740481C1C}">
-                <a14:useLocalDpi xmlns:a14="http://schemas.microsoft.com/office/drawing/2010/main" val="0"/>
+                <a14:useLocalDpi xmlns:a14="http://schemas.microsoft.com/office/drawing/2010/main" xmlns="" val="0"/>
               </a:ext>
             </a:extLst>
           </a:blip>
@@ -6451,7 +6411,7 @@
           <a:noFill/>
           <a:extLst>
             <a:ext uri="{909E8E84-426E-40DD-AFC4-6F175D3DCCD1}">
-              <a14:hiddenFill xmlns:a14="http://schemas.microsoft.com/office/drawing/2010/main">
+              <a14:hiddenFill xmlns:a14="http://schemas.microsoft.com/office/drawing/2010/main" xmlns="">
                 <a:solidFill>
                   <a:srgbClr val="FFFFFF"/>
                 </a:solidFill>
@@ -6469,10 +6429,10 @@
           <p:nvPr/>
         </p:nvPicPr>
         <p:blipFill>
-          <a:blip r:embed="rId4">
+          <a:blip r:embed="rId4" cstate="print">
             <a:extLst>
               <a:ext uri="{28A0092B-C50C-407E-A947-70E740481C1C}">
-                <a14:useLocalDpi xmlns:a14="http://schemas.microsoft.com/office/drawing/2010/main" val="0"/>
+                <a14:useLocalDpi xmlns:a14="http://schemas.microsoft.com/office/drawing/2010/main" xmlns="" val="0"/>
               </a:ext>
             </a:extLst>
           </a:blip>
@@ -6492,7 +6452,7 @@
           <a:noFill/>
           <a:extLst>
             <a:ext uri="{909E8E84-426E-40DD-AFC4-6F175D3DCCD1}">
-              <a14:hiddenFill xmlns:a14="http://schemas.microsoft.com/office/drawing/2010/main">
+              <a14:hiddenFill xmlns:a14="http://schemas.microsoft.com/office/drawing/2010/main" xmlns="">
                 <a:solidFill>
                   <a:srgbClr val="FFFFFF"/>
                 </a:solidFill>
@@ -6515,7 +6475,7 @@
           <a:blip r:embed="rId5" cstate="print">
             <a:extLst>
               <a:ext uri="{28A0092B-C50C-407E-A947-70E740481C1C}">
-                <a14:useLocalDpi xmlns:a14="http://schemas.microsoft.com/office/drawing/2010/main" val="0"/>
+                <a14:useLocalDpi xmlns:a14="http://schemas.microsoft.com/office/drawing/2010/main" xmlns="" val="0"/>
               </a:ext>
             </a:extLst>
           </a:blip>
@@ -6533,7 +6493,7 @@
           <a:noFill/>
           <a:extLst>
             <a:ext uri="{909E8E84-426E-40DD-AFC4-6F175D3DCCD1}">
-              <a14:hiddenFill xmlns:a14="http://schemas.microsoft.com/office/drawing/2010/main">
+              <a14:hiddenFill xmlns:a14="http://schemas.microsoft.com/office/drawing/2010/main" xmlns="">
                 <a:solidFill>
                   <a:srgbClr val="FFFFFF"/>
                 </a:solidFill>
@@ -6551,10 +6511,10 @@
           <p:nvPr/>
         </p:nvPicPr>
         <p:blipFill rotWithShape="1">
-          <a:blip r:embed="rId6">
+          <a:blip r:embed="rId6" cstate="print">
             <a:extLst>
               <a:ext uri="{28A0092B-C50C-407E-A947-70E740481C1C}">
-                <a14:useLocalDpi xmlns:a14="http://schemas.microsoft.com/office/drawing/2010/main" val="0"/>
+                <a14:useLocalDpi xmlns:a14="http://schemas.microsoft.com/office/drawing/2010/main" xmlns="" val="0"/>
               </a:ext>
             </a:extLst>
           </a:blip>
@@ -6572,7 +6532,7 @@
           <a:noFill/>
           <a:extLst>
             <a:ext uri="{909E8E84-426E-40DD-AFC4-6F175D3DCCD1}">
-              <a14:hiddenFill xmlns:a14="http://schemas.microsoft.com/office/drawing/2010/main">
+              <a14:hiddenFill xmlns:a14="http://schemas.microsoft.com/office/drawing/2010/main" xmlns="">
                 <a:solidFill>
                   <a:srgbClr val="FFFFFF"/>
                 </a:solidFill>
@@ -6769,7 +6729,134 @@
     </p:spTree>
     <p:extLst>
       <p:ext uri="{BB962C8B-B14F-4D97-AF65-F5344CB8AC3E}">
-        <p14:creationId xmlns:p14="http://schemas.microsoft.com/office/powerpoint/2010/main" val="1156170633"/>
+        <p14:creationId xmlns:p14="http://schemas.microsoft.com/office/powerpoint/2010/main" xmlns="" val="1156170633"/>
+      </p:ext>
+    </p:extLst>
+  </p:cSld>
+  <p:clrMapOvr>
+    <a:masterClrMapping/>
+  </p:clrMapOvr>
+  <p:timing>
+    <p:tnLst>
+      <p:par>
+        <p:cTn id="1" dur="indefinite" restart="never" nodeType="tmRoot"/>
+      </p:par>
+    </p:tnLst>
+  </p:timing>
+</p:sld>
+</file>
+
+<file path=ppt/slides/slide4.xml><?xml version="1.0" encoding="utf-8"?>
+<p:sld xmlns:a="http://schemas.openxmlformats.org/drawingml/2006/main" xmlns:r="http://schemas.openxmlformats.org/officeDocument/2006/relationships" xmlns:p="http://schemas.openxmlformats.org/presentationml/2006/main">
+  <p:cSld>
+    <p:spTree>
+      <p:nvGrpSpPr>
+        <p:cNvPr id="1" name=""/>
+        <p:cNvGrpSpPr/>
+        <p:nvPr/>
+      </p:nvGrpSpPr>
+      <p:grpSpPr>
+        <a:xfrm>
+          <a:off x="0" y="0"/>
+          <a:ext cx="0" cy="0"/>
+          <a:chOff x="0" y="0"/>
+          <a:chExt cx="0" cy="0"/>
+        </a:xfrm>
+      </p:grpSpPr>
+      <p:sp>
+        <p:nvSpPr>
+          <p:cNvPr id="2" name="Title 1"/>
+          <p:cNvSpPr>
+            <a:spLocks noGrp="1"/>
+          </p:cNvSpPr>
+          <p:nvPr>
+            <p:ph type="title"/>
+          </p:nvPr>
+        </p:nvSpPr>
+        <p:spPr/>
+        <p:txBody>
+          <a:bodyPr/>
+          <a:lstStyle/>
+          <a:p>
+            <a:r>
+              <a:rPr lang="en-US" dirty="0" smtClean="0"/>
+              <a:t>Goal of this session</a:t>
+            </a:r>
+            <a:endParaRPr lang="en-US" dirty="0"/>
+          </a:p>
+        </p:txBody>
+      </p:sp>
+      <p:sp>
+        <p:nvSpPr>
+          <p:cNvPr id="3" name="Content Placeholder 2"/>
+          <p:cNvSpPr>
+            <a:spLocks noGrp="1"/>
+          </p:cNvSpPr>
+          <p:nvPr>
+            <p:ph idx="1"/>
+          </p:nvPr>
+        </p:nvSpPr>
+        <p:spPr/>
+        <p:txBody>
+          <a:bodyPr/>
+          <a:lstStyle/>
+          <a:p>
+            <a:r>
+              <a:rPr lang="en-US" dirty="0" smtClean="0"/>
+              <a:t>Build and Test Ultra-embedded </a:t>
+            </a:r>
+            <a:r>
+              <a:rPr lang="en-US" dirty="0" smtClean="0"/>
+              <a:t>system using COTS Hardware and reference </a:t>
+            </a:r>
+            <a:r>
+              <a:rPr lang="en-US" dirty="0" smtClean="0"/>
+              <a:t>designs</a:t>
+            </a:r>
+          </a:p>
+          <a:p>
+            <a:endParaRPr lang="en-US" dirty="0" smtClean="0"/>
+          </a:p>
+          <a:p>
+            <a:r>
+              <a:rPr lang="en-US" dirty="0" smtClean="0"/>
+              <a:t>Help understand </a:t>
+            </a:r>
+            <a:r>
+              <a:rPr lang="en-US" dirty="0" smtClean="0"/>
+              <a:t>transition from </a:t>
+            </a:r>
+            <a:r>
+              <a:rPr lang="en-US" dirty="0" err="1" smtClean="0"/>
+              <a:t>CompactRIO</a:t>
+            </a:r>
+            <a:r>
+              <a:rPr lang="en-US" dirty="0" smtClean="0"/>
+              <a:t> to </a:t>
+            </a:r>
+            <a:r>
+              <a:rPr lang="en-US" dirty="0" smtClean="0"/>
+              <a:t>SOM</a:t>
+            </a:r>
+          </a:p>
+          <a:p>
+            <a:endParaRPr lang="en-US" dirty="0" smtClean="0"/>
+          </a:p>
+          <a:p>
+            <a:r>
+              <a:rPr lang="en-US" dirty="0" smtClean="0"/>
+              <a:t>Understand FPGA Architecture for Embedded Systems</a:t>
+            </a:r>
+          </a:p>
+          <a:p>
+            <a:endParaRPr lang="en-US" dirty="0"/>
+          </a:p>
+        </p:txBody>
+      </p:sp>
+    </p:spTree>
+    <p:extLst>
+      <p:ext uri="{BB962C8B-B14F-4D97-AF65-F5344CB8AC3E}">
+        <p14:creationId xmlns:p14="http://schemas.microsoft.com/office/powerpoint/2010/main" xmlns="" val="497972247"/>
       </p:ext>
     </p:extLst>
   </p:cSld>
@@ -6813,7 +6900,12 @@
             <p:ph type="title"/>
           </p:nvPr>
         </p:nvSpPr>
-        <p:spPr/>
+        <p:spPr>
+          <a:xfrm>
+            <a:off x="431320" y="0"/>
+            <a:ext cx="10515600" cy="1325563"/>
+          </a:xfrm>
+        </p:spPr>
         <p:txBody>
           <a:bodyPr/>
           <a:lstStyle/>
@@ -6833,13 +6925,13 @@
           <p:nvPr>
             <p:extLst>
               <p:ext uri="{D42A27DB-BD31-4B8C-83A1-F6EECF244321}">
-                <p14:modId xmlns:p14="http://schemas.microsoft.com/office/powerpoint/2010/main" val="1937946862"/>
+                <p14:modId xmlns:p14="http://schemas.microsoft.com/office/powerpoint/2010/main" xmlns="" val="1937946862"/>
               </p:ext>
             </p:extLst>
           </p:nvPr>
         </p:nvGraphicFramePr>
         <p:xfrm>
-          <a:off x="953748" y="1560901"/>
+          <a:off x="1298805" y="1233098"/>
           <a:ext cx="8128000" cy="5418667"/>
         </p:xfrm>
         <a:graphic>
@@ -6851,7 +6943,7 @@
     </p:spTree>
     <p:extLst>
       <p:ext uri="{BB962C8B-B14F-4D97-AF65-F5344CB8AC3E}">
-        <p14:creationId xmlns:p14="http://schemas.microsoft.com/office/powerpoint/2010/main" val="558037365"/>
+        <p14:creationId xmlns:p14="http://schemas.microsoft.com/office/powerpoint/2010/main" xmlns="" val="558037365"/>
       </p:ext>
     </p:extLst>
   </p:cSld>
@@ -6902,7 +6994,7 @@
           <a:p>
             <a:r>
               <a:rPr lang="en-US" dirty="0" smtClean="0"/>
-              <a:t>Ask for Assistance</a:t>
+              <a:t>Logistics</a:t>
             </a:r>
             <a:endParaRPr lang="en-US" dirty="0"/>
           </a:p>
@@ -6925,8 +7017,24 @@
           <a:p>
             <a:r>
               <a:rPr lang="en-US" dirty="0" smtClean="0"/>
-              <a:t>Just Raise your hand</a:t>
-            </a:r>
+              <a:t>You will be working as Team of two people</a:t>
+            </a:r>
+            <a:endParaRPr lang="en-US" dirty="0" smtClean="0"/>
+          </a:p>
+          <a:p>
+            <a:r>
+              <a:rPr lang="en-US" dirty="0" smtClean="0"/>
+              <a:t>Raise </a:t>
+            </a:r>
+            <a:r>
+              <a:rPr lang="en-US" dirty="0" smtClean="0"/>
+              <a:t>your </a:t>
+            </a:r>
+            <a:r>
+              <a:rPr lang="en-US" dirty="0" smtClean="0"/>
+              <a:t>hand for questions</a:t>
+            </a:r>
+            <a:endParaRPr lang="en-US" dirty="0" smtClean="0"/>
           </a:p>
           <a:p>
             <a:r>
@@ -6937,10 +7045,36 @@
           </a:p>
         </p:txBody>
       </p:sp>
+      <p:pic>
+        <p:nvPicPr>
+          <p:cNvPr id="1028" name="Picture 4" descr="https://www.esl-library.com/images/flashcards/colored/sm/raise_your_hand-CT.png"/>
+          <p:cNvPicPr>
+            <a:picLocks noChangeAspect="1" noChangeArrowheads="1"/>
+          </p:cNvPicPr>
+          <p:nvPr/>
+        </p:nvPicPr>
+        <p:blipFill>
+          <a:blip r:embed="rId2" cstate="print"/>
+          <a:srcRect/>
+          <a:stretch>
+            <a:fillRect/>
+          </a:stretch>
+        </p:blipFill>
+        <p:spPr bwMode="auto">
+          <a:xfrm>
+            <a:off x="9687764" y="262386"/>
+            <a:ext cx="2381250" cy="2790825"/>
+          </a:xfrm>
+          <a:prstGeom prst="rect">
+            <a:avLst/>
+          </a:prstGeom>
+          <a:noFill/>
+        </p:spPr>
+      </p:pic>
     </p:spTree>
     <p:extLst>
       <p:ext uri="{BB962C8B-B14F-4D97-AF65-F5344CB8AC3E}">
-        <p14:creationId xmlns:p14="http://schemas.microsoft.com/office/powerpoint/2010/main" val="296491561"/>
+        <p14:creationId xmlns:p14="http://schemas.microsoft.com/office/powerpoint/2010/main" xmlns="" val="296491561"/>
       </p:ext>
     </p:extLst>
   </p:cSld>
@@ -7000,7 +7134,7 @@
     </a:clrScheme>
     <a:fontScheme name="Office">
       <a:majorFont>
-        <a:latin typeface="Calibri Light" panose="020F0302020204030204"/>
+        <a:latin typeface="Calibri Light"/>
         <a:ea typeface=""/>
         <a:cs typeface=""/>
         <a:font script="Jpan" typeface="ＭＳ Ｐゴシック"/>
@@ -7035,7 +7169,7 @@
         <a:font script="Geor" typeface="Sylfaen"/>
       </a:majorFont>
       <a:minorFont>
-        <a:latin typeface="Calibri" panose="020F0502020204030204"/>
+        <a:latin typeface="Calibri"/>
         <a:ea typeface=""/>
         <a:cs typeface=""/>
         <a:font script="Jpan" typeface="ＭＳ Ｐゴシック"/>
@@ -7212,7 +7346,7 @@
   <a:extraClrSchemeLst/>
   <a:extLst>
     <a:ext uri="{05A4C25C-085E-4340-85A3-A5531E510DB2}">
-      <thm15:themeFamily xmlns:thm15="http://schemas.microsoft.com/office/thememl/2012/main" name="Office Theme" id="{62F939B6-93AF-4DB8-9C6B-D6C7DFDC589F}" vid="{4A3C46E8-61CC-4603-A589-7422A47A8E4A}"/>
+      <thm15:themeFamily xmlns:thm15="http://schemas.microsoft.com/office/thememl/2012/main" xmlns="" name="Office Theme" id="{62F939B6-93AF-4DB8-9C6B-D6C7DFDC589F}" vid="{4A3C46E8-61CC-4603-A589-7422A47A8E4A}"/>
     </a:ext>
   </a:extLst>
 </a:theme>

</xml_diff>